<commit_message>
20220331 10주차 발표 자료(MST)
</commit_message>
<xml_diff>
--- a/_TEAM/10주차_MST(최소스패닝트리)/MST(크루스칼, 프림).pptx
+++ b/_TEAM/10주차_MST(최소스패닝트리)/MST(크루스칼, 프림).pptx
@@ -4750,8 +4750,8 @@
           </a:p>
         </p:txBody>
       </p:sp>
-      <mc:AlternateContent xmlns:mc="http://schemas.openxmlformats.org/markup-compatibility/2006">
-        <mc:Choice xmlns:a14="http://schemas.microsoft.com/office/drawing/2010/main" Requires="a14">
+      <mc:AlternateContent xmlns:mc="http://schemas.openxmlformats.org/markup-compatibility/2006" xmlns:a14="http://schemas.microsoft.com/office/drawing/2010/main">
+        <mc:Choice Requires="a14">
           <p:sp>
             <p:nvSpPr>
               <p:cNvPr id="36" name="TextBox 35">
@@ -5211,7 +5211,7 @@
             </p:txBody>
           </p:sp>
         </mc:Choice>
-        <mc:Fallback>
+        <mc:Fallback xmlns="">
           <p:sp>
             <p:nvSpPr>
               <p:cNvPr id="36" name="TextBox 35">
@@ -5809,7 +5809,7 @@
           <p:nvPr>
             <p:extLst>
               <p:ext uri="{D42A27DB-BD31-4B8C-83A1-F6EECF244321}">
-                <p14:modId xmlns:p14="http://schemas.microsoft.com/office/powerpoint/2010/main" val="2455356397"/>
+                <p14:modId xmlns:p14="http://schemas.microsoft.com/office/powerpoint/2010/main" val="608041350"/>
               </p:ext>
             </p:extLst>
           </p:nvPr>
@@ -6133,7 +6133,7 @@
                           <a:latin typeface="HY견명조" panose="02030600000101010101" pitchFamily="18" charset="-127"/>
                           <a:ea typeface="HY견명조" panose="02030600000101010101" pitchFamily="18" charset="-127"/>
                         </a:rPr>
-                        <a:t>19221197</a:t>
+                        <a:t>1922</a:t>
                       </a:r>
                       <a:endParaRPr lang="ko-KR" altLang="en-US" sz="1700" dirty="0">
                         <a:latin typeface="HY견명조" panose="02030600000101010101" pitchFamily="18" charset="-127"/>

</xml_diff>